<commit_message>
updated embedded2 with arrays
</commit_message>
<xml_diff>
--- a/presentations/ep1000_embedded2/ep1000_embedded2.pptx
+++ b/presentations/ep1000_embedded2/ep1000_embedded2.pptx
@@ -5,7 +5,7 @@
     <p:sldMasterId id="2147483660" r:id="rId1"/>
   </p:sldMasterIdLst>
   <p:notesMasterIdLst>
-    <p:notesMasterId r:id="rId19"/>
+    <p:notesMasterId r:id="rId20"/>
   </p:notesMasterIdLst>
   <p:sldIdLst>
     <p:sldId id="256" r:id="rId2"/>
@@ -21,10 +21,11 @@
     <p:sldId id="283" r:id="rId12"/>
     <p:sldId id="284" r:id="rId13"/>
     <p:sldId id="285" r:id="rId14"/>
-    <p:sldId id="286" r:id="rId15"/>
-    <p:sldId id="287" r:id="rId16"/>
-    <p:sldId id="288" r:id="rId17"/>
-    <p:sldId id="259" r:id="rId18"/>
+    <p:sldId id="289" r:id="rId15"/>
+    <p:sldId id="286" r:id="rId16"/>
+    <p:sldId id="287" r:id="rId17"/>
+    <p:sldId id="288" r:id="rId18"/>
+    <p:sldId id="259" r:id="rId19"/>
   </p:sldIdLst>
   <p:sldSz cx="9144000" cy="6858000" type="screen4x3"/>
   <p:notesSz cx="6858000" cy="9144000"/>
@@ -221,7 +222,7 @@
           <a:p>
             <a:fld id="{2A875741-58CA-43A4-9946-B635E52C5CD8}" type="datetimeFigureOut">
               <a:rPr lang="en-US" smtClean="0"/>
-              <a:t>6/3/2021</a:t>
+              <a:t>6/4/2021</a:t>
             </a:fld>
             <a:endParaRPr lang="en-US"/>
           </a:p>
@@ -631,7 +632,7 @@
           <a:p>
             <a:fld id="{9665C769-D7C3-4E51-9622-EB882B1C6B88}" type="datetime1">
               <a:rPr lang="en-US" smtClean="0"/>
-              <a:t>6/3/2021</a:t>
+              <a:t>6/4/2021</a:t>
             </a:fld>
             <a:endParaRPr lang="en-US"/>
           </a:p>
@@ -825,7 +826,7 @@
           <a:p>
             <a:fld id="{AC2FA8F2-92AD-4DF3-BB80-1A576E4607C5}" type="datetime1">
               <a:rPr lang="en-US" smtClean="0"/>
-              <a:t>6/3/2021</a:t>
+              <a:t>6/4/2021</a:t>
             </a:fld>
             <a:endParaRPr lang="en-US"/>
           </a:p>
@@ -1024,7 +1025,7 @@
           <a:p>
             <a:fld id="{FF161318-0D48-4B52-BC2D-A0EA8E79725D}" type="datetime1">
               <a:rPr lang="en-US" smtClean="0"/>
-              <a:t>6/3/2021</a:t>
+              <a:t>6/4/2021</a:t>
             </a:fld>
             <a:endParaRPr lang="en-US"/>
           </a:p>
@@ -1218,7 +1219,7 @@
           <a:p>
             <a:fld id="{828929F4-2E32-48E9-8E95-ABAA8EAAF6A9}" type="datetime1">
               <a:rPr lang="en-US" smtClean="0"/>
-              <a:t>6/3/2021</a:t>
+              <a:t>6/4/2021</a:t>
             </a:fld>
             <a:endParaRPr lang="en-US"/>
           </a:p>
@@ -1481,7 +1482,7 @@
           <a:p>
             <a:fld id="{4D668969-C21F-428C-9E53-8D921FF4543A}" type="datetime1">
               <a:rPr lang="en-US" smtClean="0"/>
-              <a:t>6/3/2021</a:t>
+              <a:t>6/4/2021</a:t>
             </a:fld>
             <a:endParaRPr lang="en-US"/>
           </a:p>
@@ -1735,7 +1736,7 @@
           <a:p>
             <a:fld id="{01FB22A5-6159-4D69-BFEE-F4892803599C}" type="datetime1">
               <a:rPr lang="en-US" smtClean="0"/>
-              <a:t>6/3/2021</a:t>
+              <a:t>6/4/2021</a:t>
             </a:fld>
             <a:endParaRPr lang="en-US"/>
           </a:p>
@@ -2129,7 +2130,7 @@
           <a:p>
             <a:fld id="{738CC944-9765-440C-9A18-3DC1DA37440E}" type="datetime1">
               <a:rPr lang="en-US" smtClean="0"/>
-              <a:t>6/3/2021</a:t>
+              <a:t>6/4/2021</a:t>
             </a:fld>
             <a:endParaRPr lang="en-US"/>
           </a:p>
@@ -2263,7 +2264,7 @@
           <a:p>
             <a:fld id="{D8661C67-BB8E-4D16-A78D-460AAF94A53C}" type="datetime1">
               <a:rPr lang="en-US" smtClean="0"/>
-              <a:t>6/3/2021</a:t>
+              <a:t>6/4/2021</a:t>
             </a:fld>
             <a:endParaRPr lang="en-US"/>
           </a:p>
@@ -2374,7 +2375,7 @@
           <a:p>
             <a:fld id="{DBBC12E8-4105-456C-A90A-AF2362FB188F}" type="datetime1">
               <a:rPr lang="en-US" smtClean="0"/>
-              <a:t>6/3/2021</a:t>
+              <a:t>6/4/2021</a:t>
             </a:fld>
             <a:endParaRPr lang="en-US"/>
           </a:p>
@@ -2673,7 +2674,7 @@
           <a:p>
             <a:fld id="{11FD4DDA-56B2-4B92-884C-68E9C78E3003}" type="datetime1">
               <a:rPr lang="en-US" smtClean="0"/>
-              <a:t>6/3/2021</a:t>
+              <a:t>6/4/2021</a:t>
             </a:fld>
             <a:endParaRPr lang="en-US"/>
           </a:p>
@@ -2952,7 +2953,7 @@
           <a:p>
             <a:fld id="{750461B4-47C4-4F2C-98A2-225FD39D225C}" type="datetime1">
               <a:rPr lang="en-US" smtClean="0"/>
-              <a:t>6/3/2021</a:t>
+              <a:t>6/4/2021</a:t>
             </a:fld>
             <a:endParaRPr lang="en-US"/>
           </a:p>
@@ -3727,39 +3728,10 @@
               <a:rPr lang="en-US" smtClean="0"/>
               <a:t>10</a:t>
             </a:fld>
-            <a:endParaRPr lang="en-US"/>
-          </a:p>
-        </p:txBody>
-      </p:sp>
-      <p:pic>
-        <p:nvPicPr>
-          <p:cNvPr id="9" name="Content Placeholder 8">
-            <a:extLst>
-              <a:ext uri="{FF2B5EF4-FFF2-40B4-BE49-F238E27FC236}">
-                <a16:creationId xmlns:a16="http://schemas.microsoft.com/office/drawing/2014/main" id="{C78DFA33-8F61-4372-867E-92B542563F18}"/>
-              </a:ext>
-            </a:extLst>
-          </p:cNvPr>
-          <p:cNvPicPr>
-            <a:picLocks noGrp="1" noChangeAspect="1"/>
-          </p:cNvPicPr>
-          <p:nvPr>
-            <p:ph sz="half" idx="2"/>
-          </p:nvPr>
-        </p:nvPicPr>
-        <p:blipFill>
-          <a:blip r:embed="rId3"/>
-          <a:stretch>
-            <a:fillRect/>
-          </a:stretch>
-        </p:blipFill>
-        <p:spPr>
-          <a:xfrm>
-            <a:off x="4629150" y="1632219"/>
-            <a:ext cx="3886200" cy="2433862"/>
-          </a:xfrm>
-        </p:spPr>
-      </p:pic>
+            <a:endParaRPr lang="en-US" dirty="0"/>
+          </a:p>
+        </p:txBody>
+      </p:sp>
       <p:sp>
         <p:nvSpPr>
           <p:cNvPr id="10" name="TextBox 9">
@@ -3810,6 +3782,35 @@
           </a:p>
         </p:txBody>
       </p:sp>
+      <p:pic>
+        <p:nvPicPr>
+          <p:cNvPr id="8" name="Content Placeholder 7">
+            <a:extLst>
+              <a:ext uri="{FF2B5EF4-FFF2-40B4-BE49-F238E27FC236}">
+                <a16:creationId xmlns:a16="http://schemas.microsoft.com/office/drawing/2014/main" id="{5218403A-A934-4019-BC26-0C6BE178CE01}"/>
+              </a:ext>
+            </a:extLst>
+          </p:cNvPr>
+          <p:cNvPicPr>
+            <a:picLocks noGrp="1" noChangeAspect="1"/>
+          </p:cNvPicPr>
+          <p:nvPr>
+            <p:ph sz="half" idx="2"/>
+          </p:nvPr>
+        </p:nvPicPr>
+        <p:blipFill>
+          <a:blip r:embed="rId3"/>
+          <a:stretch>
+            <a:fillRect/>
+          </a:stretch>
+        </p:blipFill>
+        <p:spPr>
+          <a:xfrm>
+            <a:off x="4629150" y="1649209"/>
+            <a:ext cx="3886200" cy="2521403"/>
+          </a:xfrm>
+        </p:spPr>
+      </p:pic>
     </p:spTree>
     <p:extLst>
       <p:ext uri="{BB962C8B-B14F-4D97-AF65-F5344CB8AC3E}">
@@ -3972,7 +3973,7 @@
         </p:nvSpPr>
         <p:spPr>
           <a:xfrm>
-            <a:off x="5484777" y="4767343"/>
+            <a:off x="5484777" y="4794775"/>
             <a:ext cx="2799741" cy="461665"/>
           </a:xfrm>
           <a:prstGeom prst="rect">
@@ -4010,10 +4011,10 @@
       </p:sp>
       <p:pic>
         <p:nvPicPr>
-          <p:cNvPr id="8" name="Content Placeholder 7">
+          <p:cNvPr id="12" name="Content Placeholder 11">
             <a:extLst>
               <a:ext uri="{FF2B5EF4-FFF2-40B4-BE49-F238E27FC236}">
-                <a16:creationId xmlns:a16="http://schemas.microsoft.com/office/drawing/2014/main" id="{D06B03EC-260C-4CF4-A646-049D805A0E92}"/>
+                <a16:creationId xmlns:a16="http://schemas.microsoft.com/office/drawing/2014/main" id="{E576735B-0D60-4BD7-8AC1-0D7D2FB90E2C}"/>
               </a:ext>
             </a:extLst>
           </p:cNvPr>
@@ -4032,8 +4033,8 @@
         </p:blipFill>
         <p:spPr>
           <a:xfrm>
-            <a:off x="4629150" y="1757264"/>
-            <a:ext cx="3886200" cy="3006731"/>
+            <a:off x="4629150" y="1807996"/>
+            <a:ext cx="3886200" cy="2978419"/>
           </a:xfrm>
         </p:spPr>
       </p:pic>
@@ -4449,7 +4450,7 @@
           <p:cNvPr id="2" name="Title 1">
             <a:extLst>
               <a:ext uri="{FF2B5EF4-FFF2-40B4-BE49-F238E27FC236}">
-                <a16:creationId xmlns:a16="http://schemas.microsoft.com/office/drawing/2014/main" id="{5F379D2F-F338-4CDE-90B0-9742F7558CB8}"/>
+                <a16:creationId xmlns:a16="http://schemas.microsoft.com/office/drawing/2014/main" id="{77ACC1FB-F758-4245-B11A-4DA64BCD061D}"/>
               </a:ext>
             </a:extLst>
           </p:cNvPr>
@@ -4467,7 +4468,7 @@
           <a:p>
             <a:r>
               <a:rPr lang="en-SG" dirty="0"/>
-              <a:t>Class</a:t>
+              <a:t>Arrays</a:t>
             </a:r>
             <a:endParaRPr lang="en-US" dirty="0"/>
           </a:p>
@@ -4478,7 +4479,7 @@
           <p:cNvPr id="3" name="Content Placeholder 2">
             <a:extLst>
               <a:ext uri="{FF2B5EF4-FFF2-40B4-BE49-F238E27FC236}">
-                <a16:creationId xmlns:a16="http://schemas.microsoft.com/office/drawing/2014/main" id="{0AA237EA-5A83-408A-95B9-3D41221E488C}"/>
+                <a16:creationId xmlns:a16="http://schemas.microsoft.com/office/drawing/2014/main" id="{3DB841F1-4249-4068-A932-1CBB8399A370}"/>
               </a:ext>
             </a:extLst>
           </p:cNvPr>
@@ -4486,7 +4487,7 @@
             <a:spLocks noGrp="1"/>
           </p:cNvSpPr>
           <p:nvPr>
-            <p:ph idx="1"/>
+            <p:ph sz="half" idx="1"/>
           </p:nvPr>
         </p:nvSpPr>
         <p:spPr/>
@@ -4495,51 +4496,78 @@
           <a:lstStyle/>
           <a:p>
             <a:r>
-              <a:rPr lang="en-SG" sz="2400" dirty="0"/>
-              <a:t>A user-defined data type that is used to create objects.</a:t>
-            </a:r>
-          </a:p>
-          <a:p>
-            <a:r>
-              <a:rPr lang="en-SG" sz="2400" dirty="0"/>
-              <a:t>An object has</a:t>
-            </a:r>
-          </a:p>
-          <a:p>
-            <a:pPr lvl="1"/>
-            <a:r>
-              <a:rPr lang="en-SG" sz="2000" dirty="0"/>
-              <a:t>attributes (constants, variables)</a:t>
-            </a:r>
-          </a:p>
-          <a:p>
-            <a:pPr lvl="1"/>
-            <a:r>
-              <a:rPr lang="en-SG" sz="2000" dirty="0"/>
-              <a:t>methods (functions)</a:t>
-            </a:r>
-          </a:p>
-          <a:p>
-            <a:r>
-              <a:rPr lang="en-SG" sz="2400" dirty="0"/>
-              <a:t>An object’s attributes and methods are accessed using the dot (.) operator</a:t>
-            </a:r>
-          </a:p>
-          <a:p>
-            <a:r>
-              <a:rPr lang="en-SG" sz="2400" dirty="0"/>
-              <a:t>Classes are predominantly used in code libraries</a:t>
-            </a:r>
-            <a:endParaRPr lang="en-US" sz="2400" dirty="0"/>
-          </a:p>
-        </p:txBody>
-      </p:sp>
-      <p:sp>
-        <p:nvSpPr>
-          <p:cNvPr id="5" name="Slide Number Placeholder 4">
+              <a:rPr lang="en-SG" sz="1800" dirty="0"/>
+              <a:t>Arrays is a data type which can hold multiple values in a single variable.</a:t>
+            </a:r>
+          </a:p>
+          <a:p>
+            <a:r>
+              <a:rPr lang="en-SG" sz="1800" dirty="0"/>
+              <a:t>The values must be of the same data type, as defined by the array.</a:t>
+            </a:r>
+          </a:p>
+          <a:p>
+            <a:r>
+              <a:rPr lang="en-SG" sz="1800" dirty="0"/>
+              <a:t>Each element can be accessed using an index, which starts from 0.</a:t>
+            </a:r>
+          </a:p>
+          <a:p>
+            <a:r>
+              <a:rPr lang="en-SG" sz="1800" dirty="0"/>
+              <a:t>You can identify an array by the “</a:t>
+            </a:r>
+            <a:r>
+              <a:rPr lang="en-SG" sz="1800" dirty="0">
+                <a:solidFill>
+                  <a:srgbClr val="FF0000"/>
+                </a:solidFill>
+              </a:rPr>
+              <a:t>[ ]</a:t>
+            </a:r>
+            <a:r>
+              <a:rPr lang="en-SG" sz="1800" dirty="0"/>
+              <a:t>”</a:t>
+            </a:r>
+            <a:endParaRPr lang="en-US" sz="1800" dirty="0"/>
+          </a:p>
+        </p:txBody>
+      </p:sp>
+      <p:pic>
+        <p:nvPicPr>
+          <p:cNvPr id="9" name="Content Placeholder 8">
             <a:extLst>
               <a:ext uri="{FF2B5EF4-FFF2-40B4-BE49-F238E27FC236}">
-                <a16:creationId xmlns:a16="http://schemas.microsoft.com/office/drawing/2014/main" id="{5F615BF6-C25C-4B76-9F03-C275B25C54F7}"/>
+                <a16:creationId xmlns:a16="http://schemas.microsoft.com/office/drawing/2014/main" id="{1871F69D-FE0E-4D04-BD49-2F9683091EF3}"/>
+              </a:ext>
+            </a:extLst>
+          </p:cNvPr>
+          <p:cNvPicPr>
+            <a:picLocks noGrp="1" noChangeAspect="1"/>
+          </p:cNvPicPr>
+          <p:nvPr>
+            <p:ph sz="half" idx="2"/>
+          </p:nvPr>
+        </p:nvPicPr>
+        <p:blipFill>
+          <a:blip r:embed="rId2"/>
+          <a:stretch>
+            <a:fillRect/>
+          </a:stretch>
+        </p:blipFill>
+        <p:spPr>
+          <a:xfrm>
+            <a:off x="4629150" y="1931915"/>
+            <a:ext cx="3886200" cy="2108790"/>
+          </a:xfrm>
+        </p:spPr>
+      </p:pic>
+      <p:sp>
+        <p:nvSpPr>
+          <p:cNvPr id="4" name="Slide Number Placeholder 3">
+            <a:extLst>
+              <a:ext uri="{FF2B5EF4-FFF2-40B4-BE49-F238E27FC236}">
+                <a16:creationId xmlns:a16="http://schemas.microsoft.com/office/drawing/2014/main" id="{7128F83A-3B82-474B-814B-7AC557F2D01F}"/>
               </a:ext>
             </a:extLst>
           </p:cNvPr>
@@ -4563,59 +4591,10 @@
           </a:p>
         </p:txBody>
       </p:sp>
-      <p:sp>
-        <p:nvSpPr>
-          <p:cNvPr id="6" name="TextBox 5">
-            <a:extLst>
-              <a:ext uri="{FF2B5EF4-FFF2-40B4-BE49-F238E27FC236}">
-                <a16:creationId xmlns:a16="http://schemas.microsoft.com/office/drawing/2014/main" id="{486BBBE9-A901-446D-99AC-FCE9D3ABC896}"/>
-              </a:ext>
-            </a:extLst>
-          </p:cNvPr>
-          <p:cNvSpPr txBox="1"/>
-          <p:nvPr/>
-        </p:nvSpPr>
-        <p:spPr>
-          <a:xfrm>
-            <a:off x="5914741" y="5221224"/>
-            <a:ext cx="2600609" cy="830997"/>
-          </a:xfrm>
-          <a:prstGeom prst="rect">
-            <a:avLst/>
-          </a:prstGeom>
-          <a:noFill/>
-        </p:spPr>
-        <p:txBody>
-          <a:bodyPr wrap="square" rtlCol="0">
-            <a:spAutoFit/>
-          </a:bodyPr>
-          <a:lstStyle/>
-          <a:p>
-            <a:pPr algn="l"/>
-            <a:r>
-              <a:rPr lang="en-SG" sz="1600" dirty="0"/>
-              <a:t>Classes should be identified using a starting </a:t>
-            </a:r>
-            <a:r>
-              <a:rPr lang="en-SG" sz="1600" dirty="0">
-                <a:solidFill>
-                  <a:srgbClr val="FF0000"/>
-                </a:solidFill>
-              </a:rPr>
-              <a:t>uppercase </a:t>
-            </a:r>
-            <a:r>
-              <a:rPr lang="en-SG" sz="1600" dirty="0"/>
-              <a:t>character e.g. Serial</a:t>
-            </a:r>
-            <a:endParaRPr lang="en-US" sz="1600" dirty="0"/>
-          </a:p>
-        </p:txBody>
-      </p:sp>
     </p:spTree>
     <p:extLst>
       <p:ext uri="{BB962C8B-B14F-4D97-AF65-F5344CB8AC3E}">
-        <p14:creationId xmlns:p14="http://schemas.microsoft.com/office/powerpoint/2010/main" val="2125143879"/>
+        <p14:creationId xmlns:p14="http://schemas.microsoft.com/office/powerpoint/2010/main" val="1004704092"/>
       </p:ext>
     </p:extLst>
   </p:cSld>
@@ -4647,7 +4626,7 @@
           <p:cNvPr id="2" name="Title 1">
             <a:extLst>
               <a:ext uri="{FF2B5EF4-FFF2-40B4-BE49-F238E27FC236}">
-                <a16:creationId xmlns:a16="http://schemas.microsoft.com/office/drawing/2014/main" id="{8DBCB48E-BA7F-49CA-BC2F-844B55E6B7DB}"/>
+                <a16:creationId xmlns:a16="http://schemas.microsoft.com/office/drawing/2014/main" id="{5F379D2F-F338-4CDE-90B0-9742F7558CB8}"/>
               </a:ext>
             </a:extLst>
           </p:cNvPr>
@@ -4665,13 +4644,7 @@
           <a:p>
             <a:r>
               <a:rPr lang="en-SG" dirty="0"/>
-              <a:t>Directive:  </a:t>
-            </a:r>
-            <a:r>
-              <a:rPr lang="en-SG" dirty="0">
-                <a:hlinkClick r:id="rId2"/>
-              </a:rPr>
-              <a:t>#define</a:t>
+              <a:t>Class</a:t>
             </a:r>
             <a:endParaRPr lang="en-US" dirty="0"/>
           </a:p>
@@ -4682,7 +4655,7 @@
           <p:cNvPr id="3" name="Content Placeholder 2">
             <a:extLst>
               <a:ext uri="{FF2B5EF4-FFF2-40B4-BE49-F238E27FC236}">
-                <a16:creationId xmlns:a16="http://schemas.microsoft.com/office/drawing/2014/main" id="{00F0E609-DF4B-4ABF-B5A1-71CFA2E28A46}"/>
+                <a16:creationId xmlns:a16="http://schemas.microsoft.com/office/drawing/2014/main" id="{0AA237EA-5A83-408A-95B9-3D41221E488C}"/>
               </a:ext>
             </a:extLst>
           </p:cNvPr>
@@ -4690,7 +4663,7 @@
             <a:spLocks noGrp="1"/>
           </p:cNvSpPr>
           <p:nvPr>
-            <p:ph sz="half" idx="1"/>
+            <p:ph idx="1"/>
           </p:nvPr>
         </p:nvSpPr>
         <p:spPr/>
@@ -4699,42 +4672,40 @@
           <a:lstStyle/>
           <a:p>
             <a:r>
-              <a:rPr lang="en-SG" sz="2400" dirty="0">
-                <a:latin typeface="Yanone Kaffeesatz Medium" pitchFamily="2" charset="0"/>
-              </a:rPr>
-              <a:t>#define</a:t>
-            </a:r>
-            <a:r>
               <a:rPr lang="en-SG" sz="2400" dirty="0"/>
-              <a:t> is a compiler directive and not a code statement.</a:t>
+              <a:t>A user-defined data type that is used to create objects.</a:t>
             </a:r>
           </a:p>
           <a:p>
             <a:r>
               <a:rPr lang="en-SG" sz="2400" dirty="0"/>
-              <a:t>Does not end with a semi-colon</a:t>
+              <a:t>An object has</a:t>
+            </a:r>
+          </a:p>
+          <a:p>
+            <a:pPr lvl="1"/>
+            <a:r>
+              <a:rPr lang="en-SG" sz="2000" dirty="0"/>
+              <a:t>attributes (constants, variables)</a:t>
+            </a:r>
+          </a:p>
+          <a:p>
+            <a:pPr lvl="1"/>
+            <a:r>
+              <a:rPr lang="en-SG" sz="2000" dirty="0"/>
+              <a:t>methods (functions)</a:t>
             </a:r>
           </a:p>
           <a:p>
             <a:r>
               <a:rPr lang="en-SG" sz="2400" dirty="0"/>
-              <a:t>Used to name a constant and assign the value</a:t>
-            </a:r>
-          </a:p>
-          <a:p>
-            <a:r>
-              <a:rPr lang="en-SG" sz="2400" dirty="0" err="1">
-                <a:solidFill>
-                  <a:srgbClr val="FF0000"/>
-                </a:solidFill>
-                <a:latin typeface="Yanone Kaffeesatz Medium" pitchFamily="2" charset="0"/>
-                <a:hlinkClick r:id="rId3"/>
-              </a:rPr>
-              <a:t>const</a:t>
-            </a:r>
+              <a:t>An object’s attributes and methods are accessed using the dot (.) operator</a:t>
+            </a:r>
+          </a:p>
+          <a:p>
             <a:r>
               <a:rPr lang="en-SG" sz="2400" dirty="0"/>
-              <a:t> is the preferred method of defining constants</a:t>
+              <a:t>Classes are predominantly used in code libraries</a:t>
             </a:r>
             <a:endParaRPr lang="en-US" sz="2400" dirty="0"/>
           </a:p>
@@ -4745,7 +4716,7 @@
           <p:cNvPr id="5" name="Slide Number Placeholder 4">
             <a:extLst>
               <a:ext uri="{FF2B5EF4-FFF2-40B4-BE49-F238E27FC236}">
-                <a16:creationId xmlns:a16="http://schemas.microsoft.com/office/drawing/2014/main" id="{AB77F8BB-EE45-46FC-B954-A6285D864120}"/>
+                <a16:creationId xmlns:a16="http://schemas.microsoft.com/office/drawing/2014/main" id="{5F615BF6-C25C-4B76-9F03-C275B25C54F7}"/>
               </a:ext>
             </a:extLst>
           </p:cNvPr>
@@ -4769,41 +4740,12 @@
           </a:p>
         </p:txBody>
       </p:sp>
-      <p:pic>
-        <p:nvPicPr>
-          <p:cNvPr id="9" name="Content Placeholder 8">
+      <p:sp>
+        <p:nvSpPr>
+          <p:cNvPr id="6" name="TextBox 5">
             <a:extLst>
               <a:ext uri="{FF2B5EF4-FFF2-40B4-BE49-F238E27FC236}">
-                <a16:creationId xmlns:a16="http://schemas.microsoft.com/office/drawing/2014/main" id="{8A405027-E8CF-4FF3-92FC-071A97893910}"/>
-              </a:ext>
-            </a:extLst>
-          </p:cNvPr>
-          <p:cNvPicPr>
-            <a:picLocks noGrp="1" noChangeAspect="1"/>
-          </p:cNvPicPr>
-          <p:nvPr>
-            <p:ph sz="half" idx="2"/>
-          </p:nvPr>
-        </p:nvPicPr>
-        <p:blipFill>
-          <a:blip r:embed="rId4"/>
-          <a:stretch>
-            <a:fillRect/>
-          </a:stretch>
-        </p:blipFill>
-        <p:spPr>
-          <a:xfrm>
-            <a:off x="4629150" y="1861106"/>
-            <a:ext cx="3886200" cy="1738343"/>
-          </a:xfrm>
-        </p:spPr>
-      </p:pic>
-      <p:sp>
-        <p:nvSpPr>
-          <p:cNvPr id="10" name="TextBox 9">
-            <a:extLst>
-              <a:ext uri="{FF2B5EF4-FFF2-40B4-BE49-F238E27FC236}">
-                <a16:creationId xmlns:a16="http://schemas.microsoft.com/office/drawing/2014/main" id="{EFCC7813-DBB4-40DE-9AA9-DDF8306C778B}"/>
+                <a16:creationId xmlns:a16="http://schemas.microsoft.com/office/drawing/2014/main" id="{486BBBE9-A901-446D-99AC-FCE9D3ABC896}"/>
               </a:ext>
             </a:extLst>
           </p:cNvPr>
@@ -4812,8 +4754,8 @@
         </p:nvSpPr>
         <p:spPr>
           <a:xfrm>
-            <a:off x="6291072" y="3703320"/>
-            <a:ext cx="2600609" cy="584775"/>
+            <a:off x="5914741" y="5221224"/>
+            <a:ext cx="2600609" cy="830997"/>
           </a:xfrm>
           <a:prstGeom prst="rect">
             <a:avLst/>
@@ -4829,7 +4771,7 @@
             <a:pPr algn="l"/>
             <a:r>
               <a:rPr lang="en-SG" sz="1600" dirty="0"/>
-              <a:t>Constants should be identified using </a:t>
+              <a:t>Classes should be identified using a starting </a:t>
             </a:r>
             <a:r>
               <a:rPr lang="en-SG" sz="1600" dirty="0">
@@ -4837,20 +4779,20 @@
                   <a:srgbClr val="FF0000"/>
                 </a:solidFill>
               </a:rPr>
-              <a:t>uppercase</a:t>
-            </a:r>
-            <a:endParaRPr lang="en-US" sz="1600" dirty="0">
-              <a:solidFill>
-                <a:srgbClr val="FF0000"/>
-              </a:solidFill>
-            </a:endParaRPr>
+              <a:t>uppercase </a:t>
+            </a:r>
+            <a:r>
+              <a:rPr lang="en-SG" sz="1600" dirty="0"/>
+              <a:t>character e.g. Serial</a:t>
+            </a:r>
+            <a:endParaRPr lang="en-US" sz="1600" dirty="0"/>
           </a:p>
         </p:txBody>
       </p:sp>
     </p:spTree>
     <p:extLst>
       <p:ext uri="{BB962C8B-B14F-4D97-AF65-F5344CB8AC3E}">
-        <p14:creationId xmlns:p14="http://schemas.microsoft.com/office/powerpoint/2010/main" val="4144671674"/>
+        <p14:creationId xmlns:p14="http://schemas.microsoft.com/office/powerpoint/2010/main" val="2125143879"/>
       </p:ext>
     </p:extLst>
   </p:cSld>
@@ -4906,7 +4848,7 @@
               <a:rPr lang="en-SG" dirty="0">
                 <a:hlinkClick r:id="rId2"/>
               </a:rPr>
-              <a:t>#include</a:t>
+              <a:t>#define</a:t>
             </a:r>
             <a:endParaRPr lang="en-US" dirty="0"/>
           </a:p>
@@ -4928,12 +4870,7 @@
             <p:ph sz="half" idx="1"/>
           </p:nvPr>
         </p:nvSpPr>
-        <p:spPr>
-          <a:xfrm>
-            <a:off x="628650" y="1825625"/>
-            <a:ext cx="6156198" cy="4351338"/>
-          </a:xfrm>
-        </p:spPr>
+        <p:spPr/>
         <p:txBody>
           <a:bodyPr/>
           <a:lstStyle/>
@@ -4942,123 +4879,39 @@
               <a:rPr lang="en-SG" sz="2400" dirty="0">
                 <a:latin typeface="Yanone Kaffeesatz Medium" pitchFamily="2" charset="0"/>
               </a:rPr>
-              <a:t>#include</a:t>
+              <a:t>#define</a:t>
             </a:r>
             <a:r>
               <a:rPr lang="en-SG" sz="2400" dirty="0"/>
-              <a:t> is a compiler directive</a:t>
-            </a:r>
-            <a:br>
+              <a:t> is a compiler directive and not a code statement.</a:t>
+            </a:r>
+          </a:p>
+          <a:p>
+            <a:r>
               <a:rPr lang="en-SG" sz="2400" dirty="0"/>
-            </a:br>
+              <a:t>Does not end with a semi-colon</a:t>
+            </a:r>
+          </a:p>
+          <a:p>
             <a:r>
               <a:rPr lang="en-SG" sz="2400" dirty="0"/>
-              <a:t>and not a code statement.</a:t>
-            </a:r>
-          </a:p>
-          <a:p>
-            <a:r>
-              <a:rPr lang="en-SG" sz="2400" dirty="0"/>
-              <a:t>Does not end with a</a:t>
-            </a:r>
-            <a:br>
-              <a:rPr lang="en-SG" sz="2400" dirty="0"/>
-            </a:br>
-            <a:r>
-              <a:rPr lang="en-SG" sz="2400" dirty="0"/>
-              <a:t>semi-colon</a:t>
-            </a:r>
-          </a:p>
-          <a:p>
-            <a:r>
-              <a:rPr lang="en-SG" sz="2400" dirty="0"/>
-              <a:t>Instructs the compiler to</a:t>
-            </a:r>
-            <a:br>
-              <a:rPr lang="en-SG" sz="2400" dirty="0"/>
-            </a:br>
-            <a:r>
-              <a:rPr lang="en-SG" sz="2400" dirty="0"/>
-              <a:t>read and insert code from</a:t>
-            </a:r>
-            <a:br>
-              <a:rPr lang="en-SG" sz="2400" dirty="0"/>
-            </a:br>
-            <a:r>
-              <a:rPr lang="en-SG" sz="2400" dirty="0"/>
-              <a:t>the target file</a:t>
-            </a:r>
-          </a:p>
-          <a:p>
-            <a:r>
-              <a:rPr lang="en-SG" sz="2400" dirty="0">
+              <a:t>Used to name a constant and assign the value</a:t>
+            </a:r>
+          </a:p>
+          <a:p>
+            <a:r>
+              <a:rPr lang="en-SG" sz="2400" dirty="0" err="1">
                 <a:solidFill>
                   <a:srgbClr val="FF0000"/>
                 </a:solidFill>
+                <a:latin typeface="Yanone Kaffeesatz Medium" pitchFamily="2" charset="0"/>
+                <a:hlinkClick r:id="rId3"/>
               </a:rPr>
-              <a:t>&lt;</a:t>
+              <a:t>const</a:t>
             </a:r>
             <a:r>
               <a:rPr lang="en-SG" sz="2400" dirty="0"/>
-              <a:t> </a:t>
-            </a:r>
-            <a:r>
-              <a:rPr lang="en-SG" sz="2400" dirty="0">
-                <a:latin typeface="Yanone Kaffeesatz Medium" pitchFamily="2" charset="0"/>
-              </a:rPr>
-              <a:t>file</a:t>
-            </a:r>
-            <a:r>
-              <a:rPr lang="en-SG" sz="2400" dirty="0"/>
-              <a:t> </a:t>
-            </a:r>
-            <a:r>
-              <a:rPr lang="en-SG" sz="2400" dirty="0">
-                <a:solidFill>
-                  <a:srgbClr val="FF0000"/>
-                </a:solidFill>
-              </a:rPr>
-              <a:t>&gt;</a:t>
-            </a:r>
-            <a:r>
-              <a:rPr lang="en-SG" sz="2400" dirty="0"/>
-              <a:t> indicates system library, found along the library path</a:t>
-            </a:r>
-          </a:p>
-          <a:p>
-            <a:r>
-              <a:rPr lang="en-SG" sz="2400" dirty="0">
-                <a:solidFill>
-                  <a:srgbClr val="FF0000"/>
-                </a:solidFill>
-              </a:rPr>
-              <a:t>“</a:t>
-            </a:r>
-            <a:r>
-              <a:rPr lang="en-SG" sz="2400" dirty="0"/>
-              <a:t> </a:t>
-            </a:r>
-            <a:r>
-              <a:rPr lang="en-SG" sz="2400" dirty="0">
-                <a:latin typeface="Yanone Kaffeesatz Medium" pitchFamily="2" charset="0"/>
-              </a:rPr>
-              <a:t>file</a:t>
-            </a:r>
-            <a:r>
-              <a:rPr lang="en-SG" sz="2400" dirty="0"/>
-              <a:t> </a:t>
-            </a:r>
-            <a:r>
-              <a:rPr lang="en-SG" sz="2400" dirty="0">
-                <a:solidFill>
-                  <a:srgbClr val="FF0000"/>
-                </a:solidFill>
-              </a:rPr>
-              <a:t>“</a:t>
-            </a:r>
-            <a:r>
-              <a:rPr lang="en-SG" sz="2400" dirty="0"/>
-              <a:t> indicates local file in same folder</a:t>
+              <a:t> is the preferred method of defining constants</a:t>
             </a:r>
             <a:endParaRPr lang="en-US" sz="2400" dirty="0"/>
           </a:p>
@@ -5088,6 +4941,330 @@
             <a:fld id="{CAB166B3-F268-4CEF-878A-CFB0D0D505D3}" type="slidenum">
               <a:rPr lang="en-US" smtClean="0"/>
               <a:t>16</a:t>
+            </a:fld>
+            <a:endParaRPr lang="en-US"/>
+          </a:p>
+        </p:txBody>
+      </p:sp>
+      <p:pic>
+        <p:nvPicPr>
+          <p:cNvPr id="9" name="Content Placeholder 8">
+            <a:extLst>
+              <a:ext uri="{FF2B5EF4-FFF2-40B4-BE49-F238E27FC236}">
+                <a16:creationId xmlns:a16="http://schemas.microsoft.com/office/drawing/2014/main" id="{8A405027-E8CF-4FF3-92FC-071A97893910}"/>
+              </a:ext>
+            </a:extLst>
+          </p:cNvPr>
+          <p:cNvPicPr>
+            <a:picLocks noGrp="1" noChangeAspect="1"/>
+          </p:cNvPicPr>
+          <p:nvPr>
+            <p:ph sz="half" idx="2"/>
+          </p:nvPr>
+        </p:nvPicPr>
+        <p:blipFill>
+          <a:blip r:embed="rId4"/>
+          <a:stretch>
+            <a:fillRect/>
+          </a:stretch>
+        </p:blipFill>
+        <p:spPr>
+          <a:xfrm>
+            <a:off x="4629150" y="1861106"/>
+            <a:ext cx="3886200" cy="1738343"/>
+          </a:xfrm>
+        </p:spPr>
+      </p:pic>
+      <p:sp>
+        <p:nvSpPr>
+          <p:cNvPr id="10" name="TextBox 9">
+            <a:extLst>
+              <a:ext uri="{FF2B5EF4-FFF2-40B4-BE49-F238E27FC236}">
+                <a16:creationId xmlns:a16="http://schemas.microsoft.com/office/drawing/2014/main" id="{EFCC7813-DBB4-40DE-9AA9-DDF8306C778B}"/>
+              </a:ext>
+            </a:extLst>
+          </p:cNvPr>
+          <p:cNvSpPr txBox="1"/>
+          <p:nvPr/>
+        </p:nvSpPr>
+        <p:spPr>
+          <a:xfrm>
+            <a:off x="6291072" y="3703320"/>
+            <a:ext cx="2600609" cy="584775"/>
+          </a:xfrm>
+          <a:prstGeom prst="rect">
+            <a:avLst/>
+          </a:prstGeom>
+          <a:noFill/>
+        </p:spPr>
+        <p:txBody>
+          <a:bodyPr wrap="square" rtlCol="0">
+            <a:spAutoFit/>
+          </a:bodyPr>
+          <a:lstStyle/>
+          <a:p>
+            <a:pPr algn="l"/>
+            <a:r>
+              <a:rPr lang="en-SG" sz="1600" dirty="0"/>
+              <a:t>Constants should be identified using </a:t>
+            </a:r>
+            <a:r>
+              <a:rPr lang="en-SG" sz="1600" dirty="0">
+                <a:solidFill>
+                  <a:srgbClr val="FF0000"/>
+                </a:solidFill>
+              </a:rPr>
+              <a:t>uppercase</a:t>
+            </a:r>
+            <a:endParaRPr lang="en-US" sz="1600" dirty="0">
+              <a:solidFill>
+                <a:srgbClr val="FF0000"/>
+              </a:solidFill>
+            </a:endParaRPr>
+          </a:p>
+        </p:txBody>
+      </p:sp>
+    </p:spTree>
+    <p:extLst>
+      <p:ext uri="{BB962C8B-B14F-4D97-AF65-F5344CB8AC3E}">
+        <p14:creationId xmlns:p14="http://schemas.microsoft.com/office/powerpoint/2010/main" val="4144671674"/>
+      </p:ext>
+    </p:extLst>
+  </p:cSld>
+  <p:clrMapOvr>
+    <a:masterClrMapping/>
+  </p:clrMapOvr>
+</p:sld>
+</file>
+
+<file path=ppt/slides/slide17.xml><?xml version="1.0" encoding="utf-8"?>
+<p:sld xmlns:a="http://schemas.openxmlformats.org/drawingml/2006/main" xmlns:r="http://schemas.openxmlformats.org/officeDocument/2006/relationships" xmlns:p="http://schemas.openxmlformats.org/presentationml/2006/main">
+  <p:cSld>
+    <p:spTree>
+      <p:nvGrpSpPr>
+        <p:cNvPr id="1" name=""/>
+        <p:cNvGrpSpPr/>
+        <p:nvPr/>
+      </p:nvGrpSpPr>
+      <p:grpSpPr>
+        <a:xfrm>
+          <a:off x="0" y="0"/>
+          <a:ext cx="0" cy="0"/>
+          <a:chOff x="0" y="0"/>
+          <a:chExt cx="0" cy="0"/>
+        </a:xfrm>
+      </p:grpSpPr>
+      <p:sp>
+        <p:nvSpPr>
+          <p:cNvPr id="2" name="Title 1">
+            <a:extLst>
+              <a:ext uri="{FF2B5EF4-FFF2-40B4-BE49-F238E27FC236}">
+                <a16:creationId xmlns:a16="http://schemas.microsoft.com/office/drawing/2014/main" id="{8DBCB48E-BA7F-49CA-BC2F-844B55E6B7DB}"/>
+              </a:ext>
+            </a:extLst>
+          </p:cNvPr>
+          <p:cNvSpPr>
+            <a:spLocks noGrp="1"/>
+          </p:cNvSpPr>
+          <p:nvPr>
+            <p:ph type="title"/>
+          </p:nvPr>
+        </p:nvSpPr>
+        <p:spPr/>
+        <p:txBody>
+          <a:bodyPr/>
+          <a:lstStyle/>
+          <a:p>
+            <a:r>
+              <a:rPr lang="en-SG" dirty="0"/>
+              <a:t>Directive:  </a:t>
+            </a:r>
+            <a:r>
+              <a:rPr lang="en-SG" dirty="0">
+                <a:hlinkClick r:id="rId2"/>
+              </a:rPr>
+              <a:t>#include</a:t>
+            </a:r>
+            <a:endParaRPr lang="en-US" dirty="0"/>
+          </a:p>
+        </p:txBody>
+      </p:sp>
+      <p:sp>
+        <p:nvSpPr>
+          <p:cNvPr id="3" name="Content Placeholder 2">
+            <a:extLst>
+              <a:ext uri="{FF2B5EF4-FFF2-40B4-BE49-F238E27FC236}">
+                <a16:creationId xmlns:a16="http://schemas.microsoft.com/office/drawing/2014/main" id="{00F0E609-DF4B-4ABF-B5A1-71CFA2E28A46}"/>
+              </a:ext>
+            </a:extLst>
+          </p:cNvPr>
+          <p:cNvSpPr>
+            <a:spLocks noGrp="1"/>
+          </p:cNvSpPr>
+          <p:nvPr>
+            <p:ph sz="half" idx="1"/>
+          </p:nvPr>
+        </p:nvSpPr>
+        <p:spPr>
+          <a:xfrm>
+            <a:off x="628650" y="1825625"/>
+            <a:ext cx="6156198" cy="4351338"/>
+          </a:xfrm>
+        </p:spPr>
+        <p:txBody>
+          <a:bodyPr/>
+          <a:lstStyle/>
+          <a:p>
+            <a:r>
+              <a:rPr lang="en-SG" sz="2400" dirty="0">
+                <a:latin typeface="Yanone Kaffeesatz Medium" pitchFamily="2" charset="0"/>
+              </a:rPr>
+              <a:t>#include</a:t>
+            </a:r>
+            <a:r>
+              <a:rPr lang="en-SG" sz="2400" dirty="0"/>
+              <a:t> is a compiler directive</a:t>
+            </a:r>
+            <a:br>
+              <a:rPr lang="en-SG" sz="2400" dirty="0"/>
+            </a:br>
+            <a:r>
+              <a:rPr lang="en-SG" sz="2400" dirty="0"/>
+              <a:t>and not a code statement.</a:t>
+            </a:r>
+          </a:p>
+          <a:p>
+            <a:r>
+              <a:rPr lang="en-SG" sz="2400" dirty="0"/>
+              <a:t>Does not end with a</a:t>
+            </a:r>
+            <a:br>
+              <a:rPr lang="en-SG" sz="2400" dirty="0"/>
+            </a:br>
+            <a:r>
+              <a:rPr lang="en-SG" sz="2400" dirty="0"/>
+              <a:t>semi-colon</a:t>
+            </a:r>
+          </a:p>
+          <a:p>
+            <a:r>
+              <a:rPr lang="en-SG" sz="2400" dirty="0"/>
+              <a:t>Instructs the compiler to</a:t>
+            </a:r>
+            <a:br>
+              <a:rPr lang="en-SG" sz="2400" dirty="0"/>
+            </a:br>
+            <a:r>
+              <a:rPr lang="en-SG" sz="2400" dirty="0"/>
+              <a:t>read and insert code from</a:t>
+            </a:r>
+            <a:br>
+              <a:rPr lang="en-SG" sz="2400" dirty="0"/>
+            </a:br>
+            <a:r>
+              <a:rPr lang="en-SG" sz="2400" dirty="0"/>
+              <a:t>the target file</a:t>
+            </a:r>
+          </a:p>
+          <a:p>
+            <a:r>
+              <a:rPr lang="en-SG" sz="2400" dirty="0">
+                <a:solidFill>
+                  <a:srgbClr val="FF0000"/>
+                </a:solidFill>
+              </a:rPr>
+              <a:t>&lt;</a:t>
+            </a:r>
+            <a:r>
+              <a:rPr lang="en-SG" sz="2400" dirty="0"/>
+              <a:t> </a:t>
+            </a:r>
+            <a:r>
+              <a:rPr lang="en-SG" sz="2400" dirty="0">
+                <a:latin typeface="Yanone Kaffeesatz Medium" pitchFamily="2" charset="0"/>
+              </a:rPr>
+              <a:t>file</a:t>
+            </a:r>
+            <a:r>
+              <a:rPr lang="en-SG" sz="2400" dirty="0"/>
+              <a:t> </a:t>
+            </a:r>
+            <a:r>
+              <a:rPr lang="en-SG" sz="2400" dirty="0">
+                <a:solidFill>
+                  <a:srgbClr val="FF0000"/>
+                </a:solidFill>
+              </a:rPr>
+              <a:t>&gt;</a:t>
+            </a:r>
+            <a:r>
+              <a:rPr lang="en-SG" sz="2400" dirty="0"/>
+              <a:t> indicates system library, found along the library path</a:t>
+            </a:r>
+          </a:p>
+          <a:p>
+            <a:r>
+              <a:rPr lang="en-SG" sz="2400" dirty="0">
+                <a:solidFill>
+                  <a:srgbClr val="FF0000"/>
+                </a:solidFill>
+              </a:rPr>
+              <a:t>“</a:t>
+            </a:r>
+            <a:r>
+              <a:rPr lang="en-SG" sz="2400" dirty="0"/>
+              <a:t> </a:t>
+            </a:r>
+            <a:r>
+              <a:rPr lang="en-SG" sz="2400" dirty="0">
+                <a:latin typeface="Yanone Kaffeesatz Medium" pitchFamily="2" charset="0"/>
+              </a:rPr>
+              <a:t>file</a:t>
+            </a:r>
+            <a:r>
+              <a:rPr lang="en-SG" sz="2400" dirty="0"/>
+              <a:t> </a:t>
+            </a:r>
+            <a:r>
+              <a:rPr lang="en-SG" sz="2400" dirty="0">
+                <a:solidFill>
+                  <a:srgbClr val="FF0000"/>
+                </a:solidFill>
+              </a:rPr>
+              <a:t>“</a:t>
+            </a:r>
+            <a:r>
+              <a:rPr lang="en-SG" sz="2400" dirty="0"/>
+              <a:t> indicates local file in same folder</a:t>
+            </a:r>
+            <a:endParaRPr lang="en-US" sz="2400" dirty="0"/>
+          </a:p>
+        </p:txBody>
+      </p:sp>
+      <p:sp>
+        <p:nvSpPr>
+          <p:cNvPr id="5" name="Slide Number Placeholder 4">
+            <a:extLst>
+              <a:ext uri="{FF2B5EF4-FFF2-40B4-BE49-F238E27FC236}">
+                <a16:creationId xmlns:a16="http://schemas.microsoft.com/office/drawing/2014/main" id="{AB77F8BB-EE45-46FC-B954-A6285D864120}"/>
+              </a:ext>
+            </a:extLst>
+          </p:cNvPr>
+          <p:cNvSpPr>
+            <a:spLocks noGrp="1"/>
+          </p:cNvSpPr>
+          <p:nvPr>
+            <p:ph type="sldNum" sz="quarter" idx="12"/>
+          </p:nvPr>
+        </p:nvSpPr>
+        <p:spPr/>
+        <p:txBody>
+          <a:bodyPr/>
+          <a:lstStyle/>
+          <a:p>
+            <a:fld id="{CAB166B3-F268-4CEF-878A-CFB0D0D505D3}" type="slidenum">
+              <a:rPr lang="en-US" smtClean="0"/>
+              <a:t>17</a:t>
             </a:fld>
             <a:endParaRPr lang="en-US"/>
           </a:p>
@@ -5135,7 +5312,7 @@
 </p:sld>
 </file>
 
-<file path=ppt/slides/slide17.xml><?xml version="1.0" encoding="utf-8"?>
+<file path=ppt/slides/slide18.xml><?xml version="1.0" encoding="utf-8"?>
 <p:sld xmlns:a="http://schemas.openxmlformats.org/drawingml/2006/main" xmlns:r="http://schemas.openxmlformats.org/officeDocument/2006/relationships" xmlns:p="http://schemas.openxmlformats.org/presentationml/2006/main">
   <p:cSld>
     <p:spTree>
@@ -5406,7 +5583,7 @@
         </p:blipFill>
         <p:spPr>
           <a:xfrm>
-            <a:off x="4818138" y="1324356"/>
+            <a:off x="5284482" y="1141476"/>
             <a:ext cx="2803861" cy="3960876"/>
           </a:xfrm>
           <a:prstGeom prst="rect">
@@ -5433,7 +5610,7 @@
         </p:nvSpPr>
         <p:spPr>
           <a:xfrm>
-            <a:off x="4864608" y="5422392"/>
+            <a:off x="5330952" y="5239512"/>
             <a:ext cx="2796599" cy="830997"/>
           </a:xfrm>
           <a:prstGeom prst="rect">

</xml_diff>